<commit_message>
add update content file
</commit_message>
<xml_diff>
--- a/design/grafic-charter/grafic-charter.pptx
+++ b/design/grafic-charter/grafic-charter.pptx
@@ -6,6 +6,7 @@
   </p:sldMasterIdLst>
   <p:sldIdLst>
     <p:sldId id="263" r:id="rId2"/>
+    <p:sldId id="264" r:id="rId3"/>
   </p:sldIdLst>
   <p:sldSz cx="6858000" cy="9144000" type="screen4x3"/>
   <p:notesSz cx="6858000" cy="9144000"/>
@@ -104,6 +105,11 @@
       </a:defRPr>
     </a:lvl9pPr>
   </p:defaultTextStyle>
+  <p:extLst>
+    <p:ext uri="{EFAFB233-063F-42B5-8137-9DF3F51BA10A}">
+      <p15:sldGuideLst xmlns:p15="http://schemas.microsoft.com/office/powerpoint/2012/main"/>
+    </p:ext>
+  </p:extLst>
 </p:presentation>
 </file>
 
@@ -238,7 +244,7 @@
           <a:p>
             <a:fld id="{E67D929B-ABA3-4B69-B4CA-0707637F83B0}" type="datetimeFigureOut">
               <a:rPr lang="fr-FR" smtClean="0"/>
-              <a:t>10/02/2021</a:t>
+              <a:t>15/02/2021</a:t>
             </a:fld>
             <a:endParaRPr lang="fr-FR"/>
           </a:p>
@@ -408,7 +414,7 @@
           <a:p>
             <a:fld id="{E67D929B-ABA3-4B69-B4CA-0707637F83B0}" type="datetimeFigureOut">
               <a:rPr lang="fr-FR" smtClean="0"/>
-              <a:t>10/02/2021</a:t>
+              <a:t>15/02/2021</a:t>
             </a:fld>
             <a:endParaRPr lang="fr-FR"/>
           </a:p>
@@ -588,7 +594,7 @@
           <a:p>
             <a:fld id="{E67D929B-ABA3-4B69-B4CA-0707637F83B0}" type="datetimeFigureOut">
               <a:rPr lang="fr-FR" smtClean="0"/>
-              <a:t>10/02/2021</a:t>
+              <a:t>15/02/2021</a:t>
             </a:fld>
             <a:endParaRPr lang="fr-FR"/>
           </a:p>
@@ -758,7 +764,7 @@
           <a:p>
             <a:fld id="{E67D929B-ABA3-4B69-B4CA-0707637F83B0}" type="datetimeFigureOut">
               <a:rPr lang="fr-FR" smtClean="0"/>
-              <a:t>10/02/2021</a:t>
+              <a:t>15/02/2021</a:t>
             </a:fld>
             <a:endParaRPr lang="fr-FR"/>
           </a:p>
@@ -1002,7 +1008,7 @@
           <a:p>
             <a:fld id="{E67D929B-ABA3-4B69-B4CA-0707637F83B0}" type="datetimeFigureOut">
               <a:rPr lang="fr-FR" smtClean="0"/>
-              <a:t>10/02/2021</a:t>
+              <a:t>15/02/2021</a:t>
             </a:fld>
             <a:endParaRPr lang="fr-FR"/>
           </a:p>
@@ -1234,7 +1240,7 @@
           <a:p>
             <a:fld id="{E67D929B-ABA3-4B69-B4CA-0707637F83B0}" type="datetimeFigureOut">
               <a:rPr lang="fr-FR" smtClean="0"/>
-              <a:t>10/02/2021</a:t>
+              <a:t>15/02/2021</a:t>
             </a:fld>
             <a:endParaRPr lang="fr-FR"/>
           </a:p>
@@ -1601,7 +1607,7 @@
           <a:p>
             <a:fld id="{E67D929B-ABA3-4B69-B4CA-0707637F83B0}" type="datetimeFigureOut">
               <a:rPr lang="fr-FR" smtClean="0"/>
-              <a:t>10/02/2021</a:t>
+              <a:t>15/02/2021</a:t>
             </a:fld>
             <a:endParaRPr lang="fr-FR"/>
           </a:p>
@@ -1719,7 +1725,7 @@
           <a:p>
             <a:fld id="{E67D929B-ABA3-4B69-B4CA-0707637F83B0}" type="datetimeFigureOut">
               <a:rPr lang="fr-FR" smtClean="0"/>
-              <a:t>10/02/2021</a:t>
+              <a:t>15/02/2021</a:t>
             </a:fld>
             <a:endParaRPr lang="fr-FR"/>
           </a:p>
@@ -1814,7 +1820,7 @@
           <a:p>
             <a:fld id="{E67D929B-ABA3-4B69-B4CA-0707637F83B0}" type="datetimeFigureOut">
               <a:rPr lang="fr-FR" smtClean="0"/>
-              <a:t>10/02/2021</a:t>
+              <a:t>15/02/2021</a:t>
             </a:fld>
             <a:endParaRPr lang="fr-FR"/>
           </a:p>
@@ -2091,7 +2097,7 @@
           <a:p>
             <a:fld id="{E67D929B-ABA3-4B69-B4CA-0707637F83B0}" type="datetimeFigureOut">
               <a:rPr lang="fr-FR" smtClean="0"/>
-              <a:t>10/02/2021</a:t>
+              <a:t>15/02/2021</a:t>
             </a:fld>
             <a:endParaRPr lang="fr-FR"/>
           </a:p>
@@ -2348,7 +2354,7 @@
           <a:p>
             <a:fld id="{E67D929B-ABA3-4B69-B4CA-0707637F83B0}" type="datetimeFigureOut">
               <a:rPr lang="fr-FR" smtClean="0"/>
-              <a:t>10/02/2021</a:t>
+              <a:t>15/02/2021</a:t>
             </a:fld>
             <a:endParaRPr lang="fr-FR"/>
           </a:p>
@@ -2561,7 +2567,7 @@
           <a:p>
             <a:fld id="{E67D929B-ABA3-4B69-B4CA-0707637F83B0}" type="datetimeFigureOut">
               <a:rPr lang="fr-FR" smtClean="0"/>
-              <a:t>10/02/2021</a:t>
+              <a:t>15/02/2021</a:t>
             </a:fld>
             <a:endParaRPr lang="fr-FR"/>
           </a:p>
@@ -3031,7 +3037,7 @@
         </p:blipFill>
         <p:spPr>
           <a:xfrm>
-            <a:off x="1012771" y="2974032"/>
+            <a:off x="1012771" y="2602584"/>
             <a:ext cx="4861032" cy="1982452"/>
           </a:xfrm>
           <a:prstGeom prst="rect">
@@ -3056,7 +3062,7 @@
         </p:nvSpPr>
         <p:spPr>
           <a:xfrm>
-            <a:off x="1012771" y="4587894"/>
+            <a:off x="1012771" y="4136416"/>
             <a:ext cx="4861032" cy="523220"/>
           </a:xfrm>
           <a:prstGeom prst="rect">
@@ -3102,7 +3108,7 @@
         </p:nvSpPr>
         <p:spPr>
           <a:xfrm>
-            <a:off x="366712" y="976486"/>
+            <a:off x="366711" y="790762"/>
             <a:ext cx="6124575" cy="1555009"/>
           </a:xfrm>
           <a:prstGeom prst="rect">
@@ -3121,20 +3127,23 @@
           <a:p>
             <a:r>
               <a:rPr lang="fr-FR" sz="1400" dirty="0">
-                <a:cs typeface="Calibri"/>
+                <a:ea typeface="Tahoma" panose="020B0604030504040204" pitchFamily="34" charset="0"/>
+                <a:cs typeface="Tahoma" panose="020B0604030504040204" pitchFamily="34" charset="0"/>
               </a:rPr>
               <a:t> Comment concilier des considérations esthétiques et la problématique de l'universalité de la lisibilité d'une page web ?</a:t>
             </a:r>
           </a:p>
           <a:p>
             <a:endParaRPr lang="fr-FR" sz="1400" dirty="0">
-              <a:cs typeface="Calibri"/>
+              <a:ea typeface="Tahoma" panose="020B0604030504040204" pitchFamily="34" charset="0"/>
+              <a:cs typeface="Tahoma" panose="020B0604030504040204" pitchFamily="34" charset="0"/>
             </a:endParaRPr>
           </a:p>
           <a:p>
             <a:r>
               <a:rPr lang="fr-FR" sz="1400" dirty="0">
-                <a:cs typeface="Calibri"/>
+                <a:ea typeface="Tahoma" panose="020B0604030504040204" pitchFamily="34" charset="0"/>
+                <a:cs typeface="Tahoma" panose="020B0604030504040204" pitchFamily="34" charset="0"/>
               </a:rPr>
               <a:t> C'est la question qui a dirigé nos choix de couleurs. Nous nous sommes demandés quelles étaient les couleurs compatibles avec les 3 formes de daltonisme.</a:t>
             </a:r>
@@ -3142,9 +3151,144 @@
           <a:p>
             <a:r>
               <a:rPr lang="fr-FR" sz="1400" dirty="0">
-                <a:cs typeface="Calibri"/>
+                <a:ea typeface="Tahoma" panose="020B0604030504040204" pitchFamily="34" charset="0"/>
+                <a:cs typeface="Tahoma" panose="020B0604030504040204" pitchFamily="34" charset="0"/>
               </a:rPr>
               <a:t> Le résultat de nos recherches nous impose un cadre bien délimité et pas forcément facile au regard des tendances actuelles en terme de couleurs.</a:t>
+            </a:r>
+          </a:p>
+        </p:txBody>
+      </p:sp>
+      <p:sp>
+        <p:nvSpPr>
+          <p:cNvPr id="5" name="ZoneTexte 4">
+            <a:extLst>
+              <a:ext uri="{FF2B5EF4-FFF2-40B4-BE49-F238E27FC236}">
+                <a16:creationId xmlns:a16="http://schemas.microsoft.com/office/drawing/2014/main" id="{755BFB6C-F625-4226-A508-5A4274DA6400}"/>
+              </a:ext>
+            </a:extLst>
+          </p:cNvPr>
+          <p:cNvSpPr txBox="1"/>
+          <p:nvPr/>
+        </p:nvSpPr>
+        <p:spPr>
+          <a:xfrm>
+            <a:off x="366711" y="4656125"/>
+            <a:ext cx="6124575" cy="738664"/>
+          </a:xfrm>
+          <a:prstGeom prst="rect">
+            <a:avLst/>
+          </a:prstGeom>
+          <a:noFill/>
+        </p:spPr>
+        <p:txBody>
+          <a:bodyPr wrap="square" rtlCol="0">
+            <a:spAutoFit/>
+          </a:bodyPr>
+          <a:lstStyle/>
+          <a:p>
+            <a:r>
+              <a:rPr lang="fr-FR" sz="1400" dirty="0"/>
+              <a:t>Accord commun pour intégrer une fonctionnalité afin que ceux qui le désirent puissent changer la typographie du site pour quelle s’adapte aux personnes dyslexiques.</a:t>
+            </a:r>
+          </a:p>
+        </p:txBody>
+      </p:sp>
+      <p:sp>
+        <p:nvSpPr>
+          <p:cNvPr id="10" name="ZoneTexte 9">
+            <a:extLst>
+              <a:ext uri="{FF2B5EF4-FFF2-40B4-BE49-F238E27FC236}">
+                <a16:creationId xmlns:a16="http://schemas.microsoft.com/office/drawing/2014/main" id="{C4E3D455-3A70-40F9-8912-506258654ED6}"/>
+              </a:ext>
+            </a:extLst>
+          </p:cNvPr>
+          <p:cNvSpPr txBox="1"/>
+          <p:nvPr/>
+        </p:nvSpPr>
+        <p:spPr>
+          <a:xfrm>
+            <a:off x="1557337" y="5624619"/>
+            <a:ext cx="3771900" cy="3231654"/>
+          </a:xfrm>
+          <a:prstGeom prst="rect">
+            <a:avLst/>
+          </a:prstGeom>
+          <a:noFill/>
+        </p:spPr>
+        <p:txBody>
+          <a:bodyPr wrap="square" rtlCol="0">
+            <a:spAutoFit/>
+          </a:bodyPr>
+          <a:lstStyle/>
+          <a:p>
+            <a:pPr algn="ctr"/>
+            <a:r>
+              <a:rPr lang="fr-FR" sz="2800" dirty="0" err="1">
+                <a:latin typeface="OpenDyslexic" panose="00000500000000000000" pitchFamily="50" charset="0"/>
+                <a:cs typeface="Adobe Hebrew" panose="02040503050201020203" pitchFamily="18" charset="-79"/>
+              </a:rPr>
+              <a:t>OpenDyslexic</a:t>
+            </a:r>
+            <a:endParaRPr lang="fr-FR" sz="2800" dirty="0">
+              <a:latin typeface="OpenDyslexic" panose="00000500000000000000" pitchFamily="50" charset="0"/>
+              <a:cs typeface="Adobe Hebrew" panose="02040503050201020203" pitchFamily="18" charset="-79"/>
+            </a:endParaRPr>
+          </a:p>
+          <a:p>
+            <a:r>
+              <a:rPr lang="fr-FR" sz="2800" dirty="0">
+                <a:latin typeface="OpenDyslexic" panose="00000500000000000000" pitchFamily="50" charset="0"/>
+                <a:cs typeface="Adobe Hebrew" panose="02040503050201020203" pitchFamily="18" charset="-79"/>
+              </a:rPr>
+              <a:t>ABCDEFGHIJKLMNOPQRSTUVWXYZ</a:t>
+            </a:r>
+          </a:p>
+          <a:p>
+            <a:r>
+              <a:rPr lang="fr-FR" dirty="0" err="1">
+                <a:latin typeface="OpenDyslexic" panose="00000500000000000000" pitchFamily="50" charset="0"/>
+                <a:cs typeface="Adobe Hebrew" panose="02040503050201020203" pitchFamily="18" charset="-79"/>
+              </a:rPr>
+              <a:t>Abcdefghijklmnopqrstuvwxyz</a:t>
+            </a:r>
+            <a:endParaRPr lang="fr-FR" dirty="0">
+              <a:latin typeface="OpenDyslexic" panose="00000500000000000000" pitchFamily="50" charset="0"/>
+              <a:cs typeface="Adobe Hebrew" panose="02040503050201020203" pitchFamily="18" charset="-79"/>
+            </a:endParaRPr>
+          </a:p>
+          <a:p>
+            <a:r>
+              <a:rPr lang="fr-FR" sz="2800" dirty="0">
+                <a:latin typeface="OpenDyslexic" panose="00000500000000000000" pitchFamily="50" charset="0"/>
+                <a:cs typeface="Adobe Hebrew" panose="02040503050201020203" pitchFamily="18" charset="-79"/>
+              </a:rPr>
+              <a:t>1234567890</a:t>
+            </a:r>
+          </a:p>
+          <a:p>
+            <a:r>
+              <a:rPr lang="fr-FR" sz="2800" dirty="0" err="1">
+                <a:latin typeface="OpenDyslexic" panose="00000500000000000000" pitchFamily="50" charset="0"/>
+                <a:cs typeface="Adobe Hebrew" panose="02040503050201020203" pitchFamily="18" charset="-79"/>
+              </a:rPr>
+              <a:t>àéèçùû</a:t>
+            </a:r>
+            <a:r>
+              <a:rPr lang="fr-FR" sz="2800" dirty="0">
+                <a:latin typeface="OpenDyslexic" panose="00000500000000000000" pitchFamily="50" charset="0"/>
+                <a:cs typeface="Adobe Hebrew" panose="02040503050201020203" pitchFamily="18" charset="-79"/>
+              </a:rPr>
+              <a:t> </a:t>
+            </a:r>
+          </a:p>
+          <a:p>
+            <a:r>
+              <a:rPr lang="fr-FR" sz="2800" dirty="0">
+                <a:latin typeface="OpenDyslexic" panose="00000500000000000000" pitchFamily="50" charset="0"/>
+                <a:cs typeface="Adobe Hebrew" panose="02040503050201020203" pitchFamily="18" charset="-79"/>
+              </a:rPr>
+              <a:t>ÀÈÉÇ</a:t>
             </a:r>
           </a:p>
         </p:txBody>
@@ -3153,6 +3297,289 @@
     <p:extLst>
       <p:ext uri="{BB962C8B-B14F-4D97-AF65-F5344CB8AC3E}">
         <p14:creationId xmlns:p14="http://schemas.microsoft.com/office/powerpoint/2010/main" val="3966233846"/>
+      </p:ext>
+    </p:extLst>
+  </p:cSld>
+  <p:clrMapOvr>
+    <a:masterClrMapping/>
+  </p:clrMapOvr>
+</p:sld>
+</file>
+
+<file path=ppt/slides/slide2.xml><?xml version="1.0" encoding="utf-8"?>
+<p:sld xmlns:a="http://schemas.openxmlformats.org/drawingml/2006/main" xmlns:r="http://schemas.openxmlformats.org/officeDocument/2006/relationships" xmlns:p="http://schemas.openxmlformats.org/presentationml/2006/main">
+  <p:cSld>
+    <p:spTree>
+      <p:nvGrpSpPr>
+        <p:cNvPr id="1" name=""/>
+        <p:cNvGrpSpPr/>
+        <p:nvPr/>
+      </p:nvGrpSpPr>
+      <p:grpSpPr>
+        <a:xfrm>
+          <a:off x="0" y="0"/>
+          <a:ext cx="0" cy="0"/>
+          <a:chOff x="0" y="0"/>
+          <a:chExt cx="0" cy="0"/>
+        </a:xfrm>
+      </p:grpSpPr>
+      <p:sp>
+        <p:nvSpPr>
+          <p:cNvPr id="9" name="ZoneTexte 8">
+            <a:extLst>
+              <a:ext uri="{FF2B5EF4-FFF2-40B4-BE49-F238E27FC236}">
+                <a16:creationId xmlns:a16="http://schemas.microsoft.com/office/drawing/2014/main" id="{F105D79D-3661-40A3-85FB-701C7B092B86}"/>
+              </a:ext>
+            </a:extLst>
+          </p:cNvPr>
+          <p:cNvSpPr txBox="1"/>
+          <p:nvPr/>
+        </p:nvSpPr>
+        <p:spPr>
+          <a:xfrm>
+            <a:off x="1543050" y="3356282"/>
+            <a:ext cx="3771900" cy="2431435"/>
+          </a:xfrm>
+          <a:prstGeom prst="rect">
+            <a:avLst/>
+          </a:prstGeom>
+          <a:noFill/>
+        </p:spPr>
+        <p:txBody>
+          <a:bodyPr wrap="square" rtlCol="0">
+            <a:spAutoFit/>
+          </a:bodyPr>
+          <a:lstStyle/>
+          <a:p>
+            <a:pPr algn="ctr"/>
+            <a:r>
+              <a:rPr lang="fr-FR" sz="2400" dirty="0">
+                <a:latin typeface="Helvetica" pitchFamily="2" charset="0"/>
+                <a:cs typeface="Adobe Hebrew" panose="02040503050201020203" pitchFamily="18" charset="-79"/>
+              </a:rPr>
+              <a:t>HELVETICA</a:t>
+            </a:r>
+          </a:p>
+          <a:p>
+            <a:r>
+              <a:rPr lang="fr-FR" sz="2000" dirty="0">
+                <a:latin typeface="Helvetica" pitchFamily="2" charset="0"/>
+                <a:cs typeface="Adobe Hebrew" panose="02040503050201020203" pitchFamily="18" charset="-79"/>
+              </a:rPr>
+              <a:t>ABCDEFGHIJKLMNOPQRSTUVWXYZ</a:t>
+            </a:r>
+            <a:endParaRPr lang="fr-FR" sz="2400" dirty="0">
+              <a:latin typeface="Helvetica" pitchFamily="2" charset="0"/>
+              <a:cs typeface="Adobe Hebrew" panose="02040503050201020203" pitchFamily="18" charset="-79"/>
+            </a:endParaRPr>
+          </a:p>
+          <a:p>
+            <a:r>
+              <a:rPr lang="fr-FR" sz="1600" dirty="0" err="1">
+                <a:latin typeface="Helvetica" pitchFamily="2" charset="0"/>
+                <a:cs typeface="Adobe Hebrew" panose="02040503050201020203" pitchFamily="18" charset="-79"/>
+              </a:rPr>
+              <a:t>Abcdefghijklmnopqrstuvwxyz</a:t>
+            </a:r>
+            <a:endParaRPr lang="fr-FR" sz="1600" dirty="0">
+              <a:latin typeface="Helvetica" pitchFamily="2" charset="0"/>
+              <a:cs typeface="Adobe Hebrew" panose="02040503050201020203" pitchFamily="18" charset="-79"/>
+            </a:endParaRPr>
+          </a:p>
+          <a:p>
+            <a:r>
+              <a:rPr lang="fr-FR" sz="2400" dirty="0">
+                <a:latin typeface="Helvetica" pitchFamily="2" charset="0"/>
+                <a:cs typeface="Adobe Hebrew" panose="02040503050201020203" pitchFamily="18" charset="-79"/>
+              </a:rPr>
+              <a:t>1234567890</a:t>
+            </a:r>
+          </a:p>
+          <a:p>
+            <a:r>
+              <a:rPr lang="fr-FR" sz="2400" dirty="0" err="1">
+                <a:latin typeface="Helvetica" pitchFamily="2" charset="0"/>
+                <a:cs typeface="Adobe Hebrew" panose="02040503050201020203" pitchFamily="18" charset="-79"/>
+              </a:rPr>
+              <a:t>àéèçùû</a:t>
+            </a:r>
+            <a:r>
+              <a:rPr lang="fr-FR" sz="2400" dirty="0">
+                <a:latin typeface="Helvetica" pitchFamily="2" charset="0"/>
+                <a:cs typeface="Adobe Hebrew" panose="02040503050201020203" pitchFamily="18" charset="-79"/>
+              </a:rPr>
+              <a:t> </a:t>
+            </a:r>
+          </a:p>
+          <a:p>
+            <a:r>
+              <a:rPr lang="fr-FR" sz="2400" dirty="0">
+                <a:latin typeface="Helvetica" pitchFamily="2" charset="0"/>
+                <a:cs typeface="Adobe Hebrew" panose="02040503050201020203" pitchFamily="18" charset="-79"/>
+              </a:rPr>
+              <a:t>ÀÈÉÇ</a:t>
+            </a:r>
+          </a:p>
+        </p:txBody>
+      </p:sp>
+      <p:sp>
+        <p:nvSpPr>
+          <p:cNvPr id="4" name="ZoneTexte 3">
+            <a:extLst>
+              <a:ext uri="{FF2B5EF4-FFF2-40B4-BE49-F238E27FC236}">
+                <a16:creationId xmlns:a16="http://schemas.microsoft.com/office/drawing/2014/main" id="{E01D06DD-EBF1-42F8-86D7-C9FDD309E993}"/>
+              </a:ext>
+            </a:extLst>
+          </p:cNvPr>
+          <p:cNvSpPr txBox="1"/>
+          <p:nvPr/>
+        </p:nvSpPr>
+        <p:spPr>
+          <a:xfrm>
+            <a:off x="1543050" y="6209889"/>
+            <a:ext cx="3771900" cy="2431435"/>
+          </a:xfrm>
+          <a:prstGeom prst="rect">
+            <a:avLst/>
+          </a:prstGeom>
+          <a:noFill/>
+        </p:spPr>
+        <p:txBody>
+          <a:bodyPr wrap="square" rtlCol="0">
+            <a:spAutoFit/>
+          </a:bodyPr>
+          <a:lstStyle/>
+          <a:p>
+            <a:pPr algn="ctr"/>
+            <a:r>
+              <a:rPr lang="fr-FR" sz="2400" b="1" i="1" dirty="0">
+                <a:latin typeface="Helvetica" pitchFamily="2" charset="0"/>
+                <a:cs typeface="Adobe Hebrew" panose="02040503050201020203" pitchFamily="18" charset="-79"/>
+              </a:rPr>
+              <a:t>HELVETICA</a:t>
+            </a:r>
+          </a:p>
+          <a:p>
+            <a:r>
+              <a:rPr lang="fr-FR" sz="2000" b="1" i="1" dirty="0">
+                <a:latin typeface="Helvetica" pitchFamily="2" charset="0"/>
+                <a:cs typeface="Adobe Hebrew" panose="02040503050201020203" pitchFamily="18" charset="-79"/>
+              </a:rPr>
+              <a:t>ABCDEFGHIJKLMNOPQRSTUVWXYZ</a:t>
+            </a:r>
+            <a:endParaRPr lang="fr-FR" sz="2400" b="1" i="1" dirty="0">
+              <a:latin typeface="Helvetica" pitchFamily="2" charset="0"/>
+              <a:cs typeface="Adobe Hebrew" panose="02040503050201020203" pitchFamily="18" charset="-79"/>
+            </a:endParaRPr>
+          </a:p>
+          <a:p>
+            <a:r>
+              <a:rPr lang="fr-FR" sz="1600" b="1" i="1" dirty="0" err="1">
+                <a:latin typeface="Helvetica" pitchFamily="2" charset="0"/>
+                <a:cs typeface="Adobe Hebrew" panose="02040503050201020203" pitchFamily="18" charset="-79"/>
+              </a:rPr>
+              <a:t>Abcdefghijklmnopqrstuvwxyz</a:t>
+            </a:r>
+            <a:endParaRPr lang="fr-FR" sz="1600" b="1" i="1" dirty="0">
+              <a:latin typeface="Helvetica" pitchFamily="2" charset="0"/>
+              <a:cs typeface="Adobe Hebrew" panose="02040503050201020203" pitchFamily="18" charset="-79"/>
+            </a:endParaRPr>
+          </a:p>
+          <a:p>
+            <a:r>
+              <a:rPr lang="fr-FR" sz="2400" b="1" i="1" dirty="0">
+                <a:latin typeface="Helvetica" pitchFamily="2" charset="0"/>
+                <a:cs typeface="Adobe Hebrew" panose="02040503050201020203" pitchFamily="18" charset="-79"/>
+              </a:rPr>
+              <a:t>1234567890</a:t>
+            </a:r>
+          </a:p>
+          <a:p>
+            <a:r>
+              <a:rPr lang="fr-FR" sz="2400" b="1" i="1" dirty="0" err="1">
+                <a:latin typeface="Helvetica" pitchFamily="2" charset="0"/>
+                <a:cs typeface="Adobe Hebrew" panose="02040503050201020203" pitchFamily="18" charset="-79"/>
+              </a:rPr>
+              <a:t>àéèçùû</a:t>
+            </a:r>
+            <a:r>
+              <a:rPr lang="fr-FR" sz="2400" b="1" i="1" dirty="0">
+                <a:latin typeface="Helvetica" pitchFamily="2" charset="0"/>
+                <a:cs typeface="Adobe Hebrew" panose="02040503050201020203" pitchFamily="18" charset="-79"/>
+              </a:rPr>
+              <a:t> </a:t>
+            </a:r>
+          </a:p>
+          <a:p>
+            <a:r>
+              <a:rPr lang="fr-FR" sz="2400" b="1" i="1" dirty="0">
+                <a:latin typeface="Helvetica" pitchFamily="2" charset="0"/>
+                <a:cs typeface="Adobe Hebrew" panose="02040503050201020203" pitchFamily="18" charset="-79"/>
+              </a:rPr>
+              <a:t>ÀÈÉÇ</a:t>
+            </a:r>
+          </a:p>
+        </p:txBody>
+      </p:sp>
+      <p:sp>
+        <p:nvSpPr>
+          <p:cNvPr id="2" name="ZoneTexte 1">
+            <a:extLst>
+              <a:ext uri="{FF2B5EF4-FFF2-40B4-BE49-F238E27FC236}">
+                <a16:creationId xmlns:a16="http://schemas.microsoft.com/office/drawing/2014/main" id="{69E1A0D4-ADB4-4681-BC53-C029779A5F85}"/>
+              </a:ext>
+            </a:extLst>
+          </p:cNvPr>
+          <p:cNvSpPr txBox="1"/>
+          <p:nvPr/>
+        </p:nvSpPr>
+        <p:spPr>
+          <a:xfrm>
+            <a:off x="654988" y="756138"/>
+            <a:ext cx="5622720" cy="1754326"/>
+          </a:xfrm>
+          <a:prstGeom prst="rect">
+            <a:avLst/>
+          </a:prstGeom>
+          <a:noFill/>
+        </p:spPr>
+        <p:txBody>
+          <a:bodyPr wrap="square" rtlCol="0">
+            <a:spAutoFit/>
+          </a:bodyPr>
+          <a:lstStyle/>
+          <a:p>
+            <a:r>
+              <a:rPr lang="fr-FR" dirty="0"/>
+              <a:t>Dans notre démarche d’</a:t>
+            </a:r>
+            <a:r>
+              <a:rPr lang="fr-FR" dirty="0" err="1"/>
+              <a:t>accèssibilité</a:t>
+            </a:r>
+            <a:r>
+              <a:rPr lang="fr-FR" dirty="0"/>
+              <a:t> nous avons opter pour une seule police de caractère, </a:t>
+            </a:r>
+          </a:p>
+          <a:p>
+            <a:r>
+              <a:rPr lang="fr-FR" dirty="0"/>
+              <a:t>les polices avec empâtement n’étant pas conseillées pour les personnes ayant déficiences visuelles.</a:t>
+            </a:r>
+          </a:p>
+          <a:p>
+            <a:r>
+              <a:rPr lang="fr-FR" dirty="0"/>
+              <a:t>Nous avons donc fais le choix de jouer sur le « gras » de la police pour nos titres.</a:t>
+            </a:r>
+          </a:p>
+        </p:txBody>
+      </p:sp>
+    </p:spTree>
+    <p:extLst>
+      <p:ext uri="{BB962C8B-B14F-4D97-AF65-F5344CB8AC3E}">
+        <p14:creationId xmlns:p14="http://schemas.microsoft.com/office/powerpoint/2010/main" val="2045304890"/>
       </p:ext>
     </p:extLst>
   </p:cSld>

</xml_diff>